<commit_message>
updates for session 3
</commit_message>
<xml_diff>
--- a/Session 3/Softdev Session 3 2016.pptx
+++ b/Session 3/Softdev Session 3 2016.pptx
@@ -19,9 +19,9 @@
     <p:sldId id="319" r:id="rId13"/>
     <p:sldId id="320" r:id="rId14"/>
     <p:sldId id="317" r:id="rId15"/>
-    <p:sldId id="310" r:id="rId16"/>
-    <p:sldId id="307" r:id="rId17"/>
-    <p:sldId id="308" r:id="rId18"/>
+    <p:sldId id="323" r:id="rId16"/>
+    <p:sldId id="310" r:id="rId17"/>
+    <p:sldId id="307" r:id="rId18"/>
     <p:sldId id="285" r:id="rId19"/>
   </p:sldIdLst>
   <p:sldSz cx="12192000" cy="6858000"/>
@@ -6348,6 +6348,13 @@
   <p:clrMapOvr>
     <a:masterClrMapping/>
   </p:clrMapOvr>
+  <p:timing>
+    <p:tnLst>
+      <p:par>
+        <p:cTn id="1" dur="indefinite" restart="never" nodeType="tmRoot"/>
+      </p:par>
+    </p:tnLst>
+  </p:timing>
 </p:sld>
 </file>
 
@@ -6487,6 +6494,13 @@
   <p:clrMapOvr>
     <a:masterClrMapping/>
   </p:clrMapOvr>
+  <p:timing>
+    <p:tnLst>
+      <p:par>
+        <p:cTn id="1" dur="indefinite" restart="never" nodeType="tmRoot"/>
+      </p:par>
+    </p:tnLst>
+  </p:timing>
 </p:sld>
 </file>
 
@@ -7233,6 +7247,13 @@
   <p:clrMapOvr>
     <a:masterClrMapping/>
   </p:clrMapOvr>
+  <p:timing>
+    <p:tnLst>
+      <p:par>
+        <p:cTn id="1" dur="indefinite" restart="never" nodeType="tmRoot"/>
+      </p:par>
+    </p:tnLst>
+  </p:timing>
 </p:sld>
 </file>
 
@@ -7335,6 +7356,13 @@
   <p:clrMapOvr>
     <a:masterClrMapping/>
   </p:clrMapOvr>
+  <p:timing>
+    <p:tnLst>
+      <p:par>
+        <p:cTn id="1" dur="indefinite" restart="never" nodeType="tmRoot"/>
+      </p:par>
+    </p:tnLst>
+  </p:timing>
 </p:sld>
 </file>
 
@@ -7490,10 +7518,121 @@
   <p:clrMapOvr>
     <a:masterClrMapping/>
   </p:clrMapOvr>
+  <p:timing>
+    <p:tnLst>
+      <p:par>
+        <p:cTn id="1" dur="indefinite" restart="never" nodeType="tmRoot"/>
+      </p:par>
+    </p:tnLst>
+  </p:timing>
 </p:sld>
 </file>
 
 <file path=ppt/slides/slide15.xml><?xml version="1.0" encoding="utf-8"?>
+<p:sld xmlns:a="http://schemas.openxmlformats.org/drawingml/2006/main" xmlns:r="http://schemas.openxmlformats.org/officeDocument/2006/relationships" xmlns:p="http://schemas.openxmlformats.org/presentationml/2006/main">
+  <p:cSld>
+    <p:spTree>
+      <p:nvGrpSpPr>
+        <p:cNvPr id="1" name=""/>
+        <p:cNvGrpSpPr/>
+        <p:nvPr/>
+      </p:nvGrpSpPr>
+      <p:grpSpPr>
+        <a:xfrm>
+          <a:off x="0" y="0"/>
+          <a:ext cx="0" cy="0"/>
+          <a:chOff x="0" y="0"/>
+          <a:chExt cx="0" cy="0"/>
+        </a:xfrm>
+      </p:grpSpPr>
+      <p:sp>
+        <p:nvSpPr>
+          <p:cNvPr id="2" name="Title 1"/>
+          <p:cNvSpPr>
+            <a:spLocks noGrp="1"/>
+          </p:cNvSpPr>
+          <p:nvPr>
+            <p:ph type="title"/>
+          </p:nvPr>
+        </p:nvSpPr>
+        <p:spPr/>
+        <p:txBody>
+          <a:bodyPr/>
+          <a:lstStyle/>
+          <a:p>
+            <a:r>
+              <a:rPr lang="en-US" dirty="0" smtClean="0"/>
+              <a:t>Code coverage</a:t>
+            </a:r>
+            <a:endParaRPr lang="en-ZA" dirty="0"/>
+          </a:p>
+        </p:txBody>
+      </p:sp>
+      <p:sp>
+        <p:nvSpPr>
+          <p:cNvPr id="3" name="Content Placeholder 2"/>
+          <p:cNvSpPr>
+            <a:spLocks noGrp="1"/>
+          </p:cNvSpPr>
+          <p:nvPr>
+            <p:ph idx="1"/>
+          </p:nvPr>
+        </p:nvSpPr>
+        <p:spPr/>
+        <p:txBody>
+          <a:bodyPr/>
+          <a:lstStyle/>
+          <a:p>
+            <a:r>
+              <a:rPr lang="en-US" dirty="0" smtClean="0"/>
+              <a:t>How well do our tests cover the code?</a:t>
+            </a:r>
+          </a:p>
+          <a:p>
+            <a:r>
+              <a:rPr lang="en-US" dirty="0" smtClean="0"/>
+              <a:t>We will use a </a:t>
+            </a:r>
+            <a:r>
+              <a:rPr lang="en-US" dirty="0" err="1" smtClean="0"/>
+              <a:t>npm</a:t>
+            </a:r>
+            <a:r>
+              <a:rPr lang="en-US" dirty="0" smtClean="0"/>
+              <a:t> tool called </a:t>
+            </a:r>
+            <a:r>
+              <a:rPr lang="en-US" dirty="0" err="1" smtClean="0"/>
+              <a:t>istanbul</a:t>
+            </a:r>
+            <a:endParaRPr lang="en-US" dirty="0" smtClean="0"/>
+          </a:p>
+          <a:p>
+            <a:endParaRPr lang="en-ZA" dirty="0"/>
+          </a:p>
+        </p:txBody>
+      </p:sp>
+    </p:spTree>
+    <p:extLst>
+      <p:ext uri="{BB962C8B-B14F-4D97-AF65-F5344CB8AC3E}">
+        <p14:creationId xmlns:p14="http://schemas.microsoft.com/office/powerpoint/2010/main" val="3082121981"/>
+      </p:ext>
+    </p:extLst>
+  </p:cSld>
+  <p:clrMapOvr>
+    <a:masterClrMapping/>
+  </p:clrMapOvr>
+  <p:timing>
+    <p:tnLst>
+      <p:par>
+        <p:cTn id="1" dur="indefinite" restart="never" nodeType="tmRoot"/>
+      </p:par>
+    </p:tnLst>
+  </p:timing>
+</p:sld>
+</file>
+
+<file path=ppt/slides/slide16.xml><?xml version="1.0" encoding="utf-8"?>
 <p:sld xmlns:a="http://schemas.openxmlformats.org/drawingml/2006/main" xmlns:r="http://schemas.openxmlformats.org/officeDocument/2006/relationships" xmlns:p="http://schemas.openxmlformats.org/presentationml/2006/main">
   <p:cSld>
     <p:spTree>
@@ -8492,151 +8631,13 @@
   <p:clrMapOvr>
     <a:masterClrMapping/>
   </p:clrMapOvr>
-</p:sld>
-</file>
-
-<file path=ppt/slides/slide16.xml><?xml version="1.0" encoding="utf-8"?>
-<p:sld xmlns:a="http://schemas.openxmlformats.org/drawingml/2006/main" xmlns:r="http://schemas.openxmlformats.org/officeDocument/2006/relationships" xmlns:p="http://schemas.openxmlformats.org/presentationml/2006/main">
-  <p:cSld>
-    <p:spTree>
-      <p:nvGrpSpPr>
-        <p:cNvPr id="1" name=""/>
-        <p:cNvGrpSpPr/>
-        <p:nvPr/>
-      </p:nvGrpSpPr>
-      <p:grpSpPr>
-        <a:xfrm>
-          <a:off x="0" y="0"/>
-          <a:ext cx="0" cy="0"/>
-          <a:chOff x="0" y="0"/>
-          <a:chExt cx="0" cy="0"/>
-        </a:xfrm>
-      </p:grpSpPr>
-      <p:sp>
-        <p:nvSpPr>
-          <p:cNvPr id="2" name="Title 1"/>
-          <p:cNvSpPr>
-            <a:spLocks noGrp="1"/>
-          </p:cNvSpPr>
-          <p:nvPr>
-            <p:ph type="title"/>
-          </p:nvPr>
-        </p:nvSpPr>
-        <p:spPr/>
-        <p:txBody>
-          <a:bodyPr/>
-          <a:lstStyle/>
-          <a:p>
-            <a:r>
-              <a:rPr lang="en-US" dirty="0" smtClean="0"/>
-              <a:t>The Course Project</a:t>
-            </a:r>
-            <a:endParaRPr lang="en-ZA" dirty="0"/>
-          </a:p>
-        </p:txBody>
-      </p:sp>
-      <p:sp>
-        <p:nvSpPr>
-          <p:cNvPr id="3" name="Content Placeholder 2"/>
-          <p:cNvSpPr>
-            <a:spLocks noGrp="1"/>
-          </p:cNvSpPr>
-          <p:nvPr>
-            <p:ph idx="1"/>
-          </p:nvPr>
-        </p:nvSpPr>
-        <p:spPr>
-          <a:xfrm>
-            <a:off x="1089457" y="1429464"/>
-            <a:ext cx="8946541" cy="4195481"/>
-          </a:xfrm>
-        </p:spPr>
-        <p:txBody>
-          <a:bodyPr>
-            <a:normAutofit/>
-          </a:bodyPr>
-          <a:lstStyle/>
-          <a:p>
-            <a:r>
-              <a:rPr lang="en-US" dirty="0" smtClean="0"/>
-              <a:t>For this project, you will be building a simple web interface which can scan selected folders for media and store that information in a database</a:t>
-            </a:r>
-          </a:p>
-          <a:p>
-            <a:r>
-              <a:rPr lang="en-US" dirty="0" smtClean="0"/>
-              <a:t>This week take the output of what was made last week and store the data in a </a:t>
-            </a:r>
-            <a:r>
-              <a:rPr lang="en-US" dirty="0" err="1" smtClean="0"/>
-              <a:t>mongodb</a:t>
-            </a:r>
-            <a:r>
-              <a:rPr lang="en-US" dirty="0" smtClean="0"/>
-              <a:t> database.</a:t>
-            </a:r>
-          </a:p>
-          <a:p>
-            <a:r>
-              <a:rPr lang="en-US" dirty="0" smtClean="0"/>
-              <a:t>The program must then print the files in the database to the console.</a:t>
-            </a:r>
-            <a:endParaRPr lang="en-ZA" dirty="0" smtClean="0"/>
-          </a:p>
-          <a:p>
-            <a:r>
-              <a:rPr lang="en-US" dirty="0" smtClean="0"/>
-              <a:t>Some Links</a:t>
-            </a:r>
-          </a:p>
-          <a:p>
-            <a:pPr lvl="1"/>
-            <a:r>
-              <a:rPr lang="en-US" dirty="0">
-                <a:hlinkClick r:id="rId2"/>
-              </a:rPr>
-              <a:t>https://</a:t>
-            </a:r>
-            <a:r>
-              <a:rPr lang="en-US" dirty="0" smtClean="0">
-                <a:hlinkClick r:id="rId2"/>
-              </a:rPr>
-              <a:t>www.npmjs.com/package/readline-sync</a:t>
-            </a:r>
-            <a:endParaRPr lang="en-US" dirty="0" smtClean="0"/>
-          </a:p>
-          <a:p>
-            <a:pPr lvl="1"/>
-            <a:r>
-              <a:rPr lang="en-US" dirty="0">
-                <a:hlinkClick r:id="rId3"/>
-              </a:rPr>
-              <a:t>http://</a:t>
-            </a:r>
-            <a:r>
-              <a:rPr lang="en-US" dirty="0" smtClean="0">
-                <a:hlinkClick r:id="rId3"/>
-              </a:rPr>
-              <a:t>stackoverflow.com/questions/2727167/getting-all-filenames-in-a-directory-with-node-js</a:t>
-            </a:r>
-            <a:endParaRPr lang="en-US" dirty="0" smtClean="0"/>
-          </a:p>
-          <a:p>
-            <a:pPr lvl="1"/>
-            <a:endParaRPr lang="en-US" dirty="0"/>
-          </a:p>
-        </p:txBody>
-      </p:sp>
-    </p:spTree>
-    <p:extLst>
-      <p:ext uri="{BB962C8B-B14F-4D97-AF65-F5344CB8AC3E}">
-        <p14:creationId xmlns:p14="http://schemas.microsoft.com/office/powerpoint/2010/main" val="1568503475"/>
-      </p:ext>
-    </p:extLst>
-  </p:cSld>
-  <p:clrMapOvr>
-    <a:masterClrMapping/>
-  </p:clrMapOvr>
+  <p:timing>
+    <p:tnLst>
+      <p:par>
+        <p:cTn id="1" dur="indefinite" restart="never" nodeType="tmRoot"/>
+      </p:par>
+    </p:tnLst>
+  </p:timing>
 </p:sld>
 </file>
 
@@ -8697,36 +8698,73 @@
           </a:xfrm>
         </p:spPr>
         <p:txBody>
-          <a:bodyPr/>
+          <a:bodyPr>
+            <a:normAutofit/>
+          </a:bodyPr>
           <a:lstStyle/>
           <a:p>
             <a:r>
               <a:rPr lang="en-US" dirty="0" smtClean="0"/>
-              <a:t>Next session we will cover how to build tests which we will incorporate into our program</a:t>
+              <a:t>For this project, you will be building a simple web interface which can scan selected folders for media and store that information in a database</a:t>
             </a:r>
           </a:p>
           <a:p>
             <a:r>
               <a:rPr lang="en-US" dirty="0" smtClean="0"/>
-              <a:t>Make sure to make the program modular</a:t>
-            </a:r>
-          </a:p>
-          <a:p>
+              <a:t>This week take the output of what was made last week and store the data in a </a:t>
+            </a:r>
+            <a:r>
+              <a:rPr lang="en-US" dirty="0" err="1" smtClean="0"/>
+              <a:t>mongodb</a:t>
+            </a:r>
             <a:r>
               <a:rPr lang="en-US" dirty="0" smtClean="0"/>
-              <a:t>We will add a database next session</a:t>
+              <a:t> database.</a:t>
             </a:r>
           </a:p>
           <a:p>
             <a:r>
               <a:rPr lang="en-US" dirty="0" smtClean="0"/>
-              <a:t>We will build an interface at the end of the course</a:t>
-            </a:r>
-          </a:p>
-          <a:p>
+              <a:t>The program must then print the files in the database to the console.</a:t>
+            </a:r>
+            <a:endParaRPr lang="en-ZA" dirty="0" smtClean="0"/>
+          </a:p>
+          <a:p>
+            <a:r>
+              <a:rPr lang="en-US" dirty="0" smtClean="0"/>
+              <a:t>Some Links</a:t>
+            </a:r>
+          </a:p>
+          <a:p>
+            <a:pPr lvl="1"/>
+            <a:r>
+              <a:rPr lang="en-US" dirty="0">
+                <a:hlinkClick r:id="rId2"/>
+              </a:rPr>
+              <a:t>https://</a:t>
+            </a:r>
+            <a:r>
+              <a:rPr lang="en-US" dirty="0" smtClean="0">
+                <a:hlinkClick r:id="rId2"/>
+              </a:rPr>
+              <a:t>www.npmjs.com/package/readline-sync</a:t>
+            </a:r>
             <a:endParaRPr lang="en-US" dirty="0" smtClean="0"/>
           </a:p>
           <a:p>
+            <a:pPr lvl="1"/>
+            <a:r>
+              <a:rPr lang="en-US" dirty="0">
+                <a:hlinkClick r:id="rId3"/>
+              </a:rPr>
+              <a:t>http://</a:t>
+            </a:r>
+            <a:r>
+              <a:rPr lang="en-US" dirty="0" smtClean="0">
+                <a:hlinkClick r:id="rId3"/>
+              </a:rPr>
+              <a:t>stackoverflow.com/questions/2727167/getting-all-filenames-in-a-directory-with-node-js</a:t>
+            </a:r>
             <a:endParaRPr lang="en-US" dirty="0" smtClean="0"/>
           </a:p>
           <a:p>
@@ -8738,13 +8776,20 @@
     </p:spTree>
     <p:extLst>
       <p:ext uri="{BB962C8B-B14F-4D97-AF65-F5344CB8AC3E}">
-        <p14:creationId xmlns:p14="http://schemas.microsoft.com/office/powerpoint/2010/main" val="2182409356"/>
+        <p14:creationId xmlns:p14="http://schemas.microsoft.com/office/powerpoint/2010/main" val="1568503475"/>
       </p:ext>
     </p:extLst>
   </p:cSld>
   <p:clrMapOvr>
     <a:masterClrMapping/>
   </p:clrMapOvr>
+  <p:timing>
+    <p:tnLst>
+      <p:par>
+        <p:cTn id="1" dur="indefinite" restart="never" nodeType="tmRoot"/>
+      </p:par>
+    </p:tnLst>
+  </p:timing>
 </p:sld>
 </file>
 
@@ -9001,6 +9046,13 @@
   <p:clrMapOvr>
     <a:masterClrMapping/>
   </p:clrMapOvr>
+  <p:timing>
+    <p:tnLst>
+      <p:par>
+        <p:cTn id="1" dur="indefinite" restart="never" nodeType="tmRoot"/>
+      </p:par>
+    </p:tnLst>
+  </p:timing>
 </p:sld>
 </file>
 
@@ -9094,6 +9146,13 @@
   <p:clrMapOvr>
     <a:masterClrMapping/>
   </p:clrMapOvr>
+  <p:timing>
+    <p:tnLst>
+      <p:par>
+        <p:cTn id="1" dur="indefinite" restart="never" nodeType="tmRoot"/>
+      </p:par>
+    </p:tnLst>
+  </p:timing>
 </p:sld>
 </file>
 
@@ -9168,27 +9227,21 @@
           </a:p>
           <a:p>
             <a:r>
-              <a:rPr lang="en-ZA">
+              <a:rPr lang="en-ZA" dirty="0">
                 <a:hlinkClick r:id="rId3"/>
               </a:rPr>
-              <a:t>https</a:t>
-            </a:r>
-            <a:r>
-              <a:rPr lang="en-ZA">
-                <a:hlinkClick r:id="rId3"/>
-              </a:rPr>
-              <a:t>://</a:t>
-            </a:r>
-            <a:r>
-              <a:rPr lang="en-ZA" smtClean="0">
+              <a:t>https://</a:t>
+            </a:r>
+            <a:r>
+              <a:rPr lang="en-ZA" dirty="0" smtClean="0">
                 <a:hlinkClick r:id="rId3"/>
               </a:rPr>
               <a:t>robomongo.org/download</a:t>
             </a:r>
-            <a:endParaRPr lang="en-ZA" smtClean="0"/>
-          </a:p>
-          <a:p>
-            <a:endParaRPr lang="en-ZA"/>
+            <a:endParaRPr lang="en-ZA" dirty="0" smtClean="0"/>
+          </a:p>
+          <a:p>
+            <a:endParaRPr lang="en-ZA" dirty="0"/>
           </a:p>
         </p:txBody>
       </p:sp>
@@ -9202,6 +9255,13 @@
   <p:clrMapOvr>
     <a:masterClrMapping/>
   </p:clrMapOvr>
+  <p:timing>
+    <p:tnLst>
+      <p:par>
+        <p:cTn id="1" dur="indefinite" restart="never" nodeType="tmRoot"/>
+      </p:par>
+    </p:tnLst>
+  </p:timing>
 </p:sld>
 </file>
 
@@ -9315,6 +9375,13 @@
   <p:clrMapOvr>
     <a:masterClrMapping/>
   </p:clrMapOvr>
+  <p:timing>
+    <p:tnLst>
+      <p:par>
+        <p:cTn id="1" dur="indefinite" restart="never" nodeType="tmRoot"/>
+      </p:par>
+    </p:tnLst>
+  </p:timing>
 </p:sld>
 </file>
 
@@ -9500,6 +9567,13 @@
   <p:clrMapOvr>
     <a:masterClrMapping/>
   </p:clrMapOvr>
+  <p:timing>
+    <p:tnLst>
+      <p:par>
+        <p:cTn id="1" dur="indefinite" restart="never" nodeType="tmRoot"/>
+      </p:par>
+    </p:tnLst>
+  </p:timing>
 </p:sld>
 </file>
 
@@ -9618,6 +9692,13 @@
   <p:clrMapOvr>
     <a:masterClrMapping/>
   </p:clrMapOvr>
+  <p:timing>
+    <p:tnLst>
+      <p:par>
+        <p:cTn id="1" dur="indefinite" restart="never" nodeType="tmRoot"/>
+      </p:par>
+    </p:tnLst>
+  </p:timing>
 </p:sld>
 </file>
 
@@ -9749,6 +9830,13 @@
   <p:clrMapOvr>
     <a:masterClrMapping/>
   </p:clrMapOvr>
+  <p:timing>
+    <p:tnLst>
+      <p:par>
+        <p:cTn id="1" dur="indefinite" restart="never" nodeType="tmRoot"/>
+      </p:par>
+    </p:tnLst>
+  </p:timing>
 </p:sld>
 </file>
 
@@ -9952,6 +10040,13 @@
   <p:clrMapOvr>
     <a:masterClrMapping/>
   </p:clrMapOvr>
+  <p:timing>
+    <p:tnLst>
+      <p:par>
+        <p:cTn id="1" dur="indefinite" restart="never" nodeType="tmRoot"/>
+      </p:par>
+    </p:tnLst>
+  </p:timing>
 </p:sld>
 </file>
 

</xml_diff>